<commit_message>
Wrote Retry Pattern example
</commit_message>
<xml_diff>
--- a/Retry Pattern/Retry Pattern.pptx
+++ b/Retry Pattern/Retry Pattern.pptx
@@ -13,8 +13,9 @@
     <p:sldId id="261" r:id="rId7"/>
     <p:sldId id="262" r:id="rId8"/>
     <p:sldId id="263" r:id="rId9"/>
-    <p:sldId id="264" r:id="rId10"/>
-    <p:sldId id="265" r:id="rId11"/>
+    <p:sldId id="266" r:id="rId10"/>
+    <p:sldId id="264" r:id="rId11"/>
+    <p:sldId id="265" r:id="rId12"/>
   </p:sldIdLst>
   <p:sldSz cx="12192000" cy="6858000"/>
   <p:notesSz cx="6858000" cy="9144000"/>
@@ -113,6 +114,11 @@
       </a:defRPr>
     </a:lvl9pPr>
   </p:defaultTextStyle>
+  <p:extLst>
+    <p:ext uri="{EFAFB233-063F-42B5-8137-9DF3F51BA10A}">
+      <p15:sldGuideLst xmlns:p15="http://schemas.microsoft.com/office/powerpoint/2012/main"/>
+    </p:ext>
+  </p:extLst>
 </p:presentation>
 </file>
 
@@ -316,7 +322,7 @@
           <a:p>
             <a:fld id="{721C8AC8-E66E-4B36-A33E-E2A5A5499C00}" type="datetimeFigureOut">
               <a:rPr lang="en-US" smtClean="0"/>
-              <a:t>29-May-19</a:t>
+              <a:t>10-Jun-19</a:t>
             </a:fld>
             <a:endParaRPr lang="en-US"/>
           </a:p>
@@ -506,7 +512,7 @@
           <a:p>
             <a:fld id="{721C8AC8-E66E-4B36-A33E-E2A5A5499C00}" type="datetimeFigureOut">
               <a:rPr lang="en-US" smtClean="0"/>
-              <a:t>29-May-19</a:t>
+              <a:t>10-Jun-19</a:t>
             </a:fld>
             <a:endParaRPr lang="en-US"/>
           </a:p>
@@ -686,7 +692,7 @@
           <a:p>
             <a:fld id="{721C8AC8-E66E-4B36-A33E-E2A5A5499C00}" type="datetimeFigureOut">
               <a:rPr lang="en-US" smtClean="0"/>
-              <a:t>29-May-19</a:t>
+              <a:t>10-Jun-19</a:t>
             </a:fld>
             <a:endParaRPr lang="en-US"/>
           </a:p>
@@ -856,7 +862,7 @@
           <a:p>
             <a:fld id="{721C8AC8-E66E-4B36-A33E-E2A5A5499C00}" type="datetimeFigureOut">
               <a:rPr lang="en-US" smtClean="0"/>
-              <a:t>29-May-19</a:t>
+              <a:t>10-Jun-19</a:t>
             </a:fld>
             <a:endParaRPr lang="en-US"/>
           </a:p>
@@ -1112,7 +1118,7 @@
           <a:p>
             <a:fld id="{721C8AC8-E66E-4B36-A33E-E2A5A5499C00}" type="datetimeFigureOut">
               <a:rPr lang="en-US" smtClean="0"/>
-              <a:t>29-May-19</a:t>
+              <a:t>10-Jun-19</a:t>
             </a:fld>
             <a:endParaRPr lang="en-US"/>
           </a:p>
@@ -1400,7 +1406,7 @@
           <a:p>
             <a:fld id="{721C8AC8-E66E-4B36-A33E-E2A5A5499C00}" type="datetimeFigureOut">
               <a:rPr lang="en-US" smtClean="0"/>
-              <a:t>29-May-19</a:t>
+              <a:t>10-Jun-19</a:t>
             </a:fld>
             <a:endParaRPr lang="en-US"/>
           </a:p>
@@ -1838,7 +1844,7 @@
           <a:p>
             <a:fld id="{721C8AC8-E66E-4B36-A33E-E2A5A5499C00}" type="datetimeFigureOut">
               <a:rPr lang="en-US" smtClean="0"/>
-              <a:t>29-May-19</a:t>
+              <a:t>10-Jun-19</a:t>
             </a:fld>
             <a:endParaRPr lang="en-US"/>
           </a:p>
@@ -1956,7 +1962,7 @@
           <a:p>
             <a:fld id="{721C8AC8-E66E-4B36-A33E-E2A5A5499C00}" type="datetimeFigureOut">
               <a:rPr lang="en-US" smtClean="0"/>
-              <a:t>29-May-19</a:t>
+              <a:t>10-Jun-19</a:t>
             </a:fld>
             <a:endParaRPr lang="en-US"/>
           </a:p>
@@ -2051,7 +2057,7 @@
           <a:p>
             <a:fld id="{721C8AC8-E66E-4B36-A33E-E2A5A5499C00}" type="datetimeFigureOut">
               <a:rPr lang="en-US" smtClean="0"/>
-              <a:t>29-May-19</a:t>
+              <a:t>10-Jun-19</a:t>
             </a:fld>
             <a:endParaRPr lang="en-US"/>
           </a:p>
@@ -2407,7 +2413,7 @@
           <a:p>
             <a:fld id="{721C8AC8-E66E-4B36-A33E-E2A5A5499C00}" type="datetimeFigureOut">
               <a:rPr lang="en-US" smtClean="0"/>
-              <a:t>29-May-19</a:t>
+              <a:t>10-Jun-19</a:t>
             </a:fld>
             <a:endParaRPr lang="en-US"/>
           </a:p>
@@ -2723,7 +2729,7 @@
           <a:p>
             <a:fld id="{721C8AC8-E66E-4B36-A33E-E2A5A5499C00}" type="datetimeFigureOut">
               <a:rPr lang="en-US" smtClean="0"/>
-              <a:t>29-May-19</a:t>
+              <a:t>10-Jun-19</a:t>
             </a:fld>
             <a:endParaRPr lang="en-US"/>
           </a:p>
@@ -2956,7 +2962,7 @@
           <a:p>
             <a:fld id="{721C8AC8-E66E-4B36-A33E-E2A5A5499C00}" type="datetimeFigureOut">
               <a:rPr lang="en-US" smtClean="0"/>
-              <a:t>29-May-19</a:t>
+              <a:t>10-Jun-19</a:t>
             </a:fld>
             <a:endParaRPr lang="en-US"/>
           </a:p>
@@ -3695,6 +3701,257 @@
           <a:chExt cx="0" cy="0"/>
         </a:xfrm>
       </p:grpSpPr>
+      <p:pic>
+        <p:nvPicPr>
+          <p:cNvPr id="3" name="Picture 2">
+            <a:extLst>
+              <a:ext uri="{FF2B5EF4-FFF2-40B4-BE49-F238E27FC236}">
+                <a16:creationId xmlns:a16="http://schemas.microsoft.com/office/drawing/2014/main" id="{4F6884D4-BCB7-4803-9043-8F0664484DA4}"/>
+              </a:ext>
+            </a:extLst>
+          </p:cNvPr>
+          <p:cNvPicPr>
+            <a:picLocks noChangeAspect="1"/>
+          </p:cNvPicPr>
+          <p:nvPr/>
+        </p:nvPicPr>
+        <p:blipFill>
+          <a:blip r:embed="rId2"/>
+          <a:stretch>
+            <a:fillRect/>
+          </a:stretch>
+        </p:blipFill>
+        <p:spPr>
+          <a:xfrm>
+            <a:off x="6096297" y="1876256"/>
+            <a:ext cx="6095703" cy="4325983"/>
+          </a:xfrm>
+          <a:prstGeom prst="rect">
+            <a:avLst/>
+          </a:prstGeom>
+        </p:spPr>
+      </p:pic>
+      <p:sp>
+        <p:nvSpPr>
+          <p:cNvPr id="2" name="Title 1">
+            <a:extLst>
+              <a:ext uri="{FF2B5EF4-FFF2-40B4-BE49-F238E27FC236}">
+                <a16:creationId xmlns:a16="http://schemas.microsoft.com/office/drawing/2014/main" id="{68614384-B23A-48E5-8352-E31CEF4C2C05}"/>
+              </a:ext>
+            </a:extLst>
+          </p:cNvPr>
+          <p:cNvSpPr>
+            <a:spLocks noGrp="1"/>
+          </p:cNvSpPr>
+          <p:nvPr>
+            <p:ph type="title"/>
+          </p:nvPr>
+        </p:nvSpPr>
+        <p:spPr/>
+        <p:txBody>
+          <a:bodyPr/>
+          <a:lstStyle/>
+          <a:p>
+            <a:r>
+              <a:rPr lang="el-GR" dirty="0"/>
+              <a:t>Παράδειγμα (2/2)</a:t>
+            </a:r>
+            <a:endParaRPr lang="en-US" dirty="0"/>
+          </a:p>
+        </p:txBody>
+      </p:sp>
+      <p:sp>
+        <p:nvSpPr>
+          <p:cNvPr id="7" name="TextBox 6">
+            <a:extLst>
+              <a:ext uri="{FF2B5EF4-FFF2-40B4-BE49-F238E27FC236}">
+                <a16:creationId xmlns:a16="http://schemas.microsoft.com/office/drawing/2014/main" id="{8ADBADF7-C8EA-40B9-9DA0-09E1C7C9B542}"/>
+              </a:ext>
+            </a:extLst>
+          </p:cNvPr>
+          <p:cNvSpPr txBox="1"/>
+          <p:nvPr/>
+        </p:nvSpPr>
+        <p:spPr>
+          <a:xfrm>
+            <a:off x="211876" y="1876256"/>
+            <a:ext cx="5675120" cy="3970318"/>
+          </a:xfrm>
+          <a:prstGeom prst="rect">
+            <a:avLst/>
+          </a:prstGeom>
+          <a:noFill/>
+        </p:spPr>
+        <p:txBody>
+          <a:bodyPr wrap="square" rtlCol="0">
+            <a:spAutoFit/>
+          </a:bodyPr>
+          <a:lstStyle/>
+          <a:p>
+            <a:r>
+              <a:rPr lang="en-US" dirty="0"/>
+              <a:t>	</a:t>
+            </a:r>
+            <a:r>
+              <a:rPr lang="el-GR" dirty="0"/>
+              <a:t>Η μέθοδος </a:t>
+            </a:r>
+            <a:r>
+              <a:rPr lang="en-US" dirty="0"/>
+              <a:t>IsTransient() </a:t>
+            </a:r>
+            <a:r>
+              <a:rPr lang="el-GR" dirty="0"/>
+              <a:t>είναι αυτή που ελέγχει αν κάποιο </a:t>
+            </a:r>
+            <a:r>
+              <a:rPr lang="en-US" dirty="0"/>
+              <a:t>exception </a:t>
+            </a:r>
+            <a:r>
+              <a:rPr lang="el-GR" dirty="0"/>
+              <a:t>μπορεί να θεωρηθεί παροδικό. Είναι τύπου </a:t>
+            </a:r>
+            <a:r>
+              <a:rPr lang="en-US" dirty="0"/>
+              <a:t>bool </a:t>
+            </a:r>
+            <a:r>
+              <a:rPr lang="el-GR" dirty="0"/>
+              <a:t>και δέχεται ως όρισμα αντικείμενο τύπου </a:t>
+            </a:r>
+            <a:r>
+              <a:rPr lang="en-US" dirty="0"/>
+              <a:t>Exception. </a:t>
+            </a:r>
+          </a:p>
+          <a:p>
+            <a:r>
+              <a:rPr lang="en-US" dirty="0"/>
+              <a:t>	</a:t>
+            </a:r>
+            <a:r>
+              <a:rPr lang="el-GR" dirty="0"/>
+              <a:t>Αρχικά γίνεται ένας έλεγχος για το αν η εξαίρεση είναι τύπου </a:t>
+            </a:r>
+            <a:r>
+              <a:rPr lang="en-US" dirty="0"/>
+              <a:t>OperationTransientException </a:t>
+            </a:r>
+            <a:r>
+              <a:rPr lang="el-GR" dirty="0"/>
+              <a:t>οπότε και επιστρέφεται </a:t>
+            </a:r>
+            <a:r>
+              <a:rPr lang="en-US" dirty="0"/>
+              <a:t>true.</a:t>
+            </a:r>
+            <a:endParaRPr lang="el-GR" dirty="0"/>
+          </a:p>
+          <a:p>
+            <a:r>
+              <a:rPr lang="el-GR" dirty="0"/>
+              <a:t>	Στη συνέχεια, γίνεται προσπάθεια μετατροπής </a:t>
+            </a:r>
+            <a:r>
+              <a:rPr lang="en-US" dirty="0"/>
+              <a:t>(cast)</a:t>
+            </a:r>
+            <a:r>
+              <a:rPr lang="el-GR" dirty="0"/>
+              <a:t> της εξαίρεσης ως </a:t>
+            </a:r>
+            <a:r>
+              <a:rPr lang="en-US" dirty="0"/>
+              <a:t>WebException</a:t>
+            </a:r>
+            <a:r>
+              <a:rPr lang="el-GR" dirty="0"/>
+              <a:t>. Σε περίπτωση αποτυχίας επιστρέφεται </a:t>
+            </a:r>
+            <a:r>
+              <a:rPr lang="en-US" dirty="0"/>
+              <a:t>false</a:t>
+            </a:r>
+            <a:r>
+              <a:rPr lang="el-GR" dirty="0"/>
+              <a:t>.</a:t>
+            </a:r>
+          </a:p>
+          <a:p>
+            <a:r>
+              <a:rPr lang="el-GR" dirty="0"/>
+              <a:t>	Αν η μετατροπή είναι επιτυχής ελέγχεται το αν η εξαίρεση έχει προκληθεί από: </a:t>
+            </a:r>
+            <a:r>
+              <a:rPr lang="en-US" dirty="0" err="1"/>
+              <a:t>ConnectionClosed</a:t>
+            </a:r>
+            <a:r>
+              <a:rPr lang="en-US" dirty="0"/>
+              <a:t>, Timeout, </a:t>
+            </a:r>
+            <a:r>
+              <a:rPr lang="en-US" dirty="0" err="1"/>
+              <a:t>RequestCanceled</a:t>
+            </a:r>
+            <a:r>
+              <a:rPr lang="en-US" dirty="0"/>
+              <a:t> </a:t>
+            </a:r>
+            <a:r>
+              <a:rPr lang="el-GR" dirty="0"/>
+              <a:t>και επιστρέφεται αντίστοιχα </a:t>
+            </a:r>
+            <a:r>
+              <a:rPr lang="en-US" dirty="0"/>
+              <a:t>true </a:t>
+            </a:r>
+            <a:r>
+              <a:rPr lang="el-GR" dirty="0"/>
+              <a:t>ή </a:t>
+            </a:r>
+            <a:r>
+              <a:rPr lang="en-US" dirty="0"/>
+              <a:t>false </a:t>
+            </a:r>
+            <a:r>
+              <a:rPr lang="el-GR" dirty="0"/>
+              <a:t>αν πρόκειται για διαφορετική αιτία.</a:t>
+            </a:r>
+          </a:p>
+        </p:txBody>
+      </p:sp>
+    </p:spTree>
+    <p:extLst>
+      <p:ext uri="{BB962C8B-B14F-4D97-AF65-F5344CB8AC3E}">
+        <p14:creationId xmlns:p14="http://schemas.microsoft.com/office/powerpoint/2010/main" val="273046310"/>
+      </p:ext>
+    </p:extLst>
+  </p:cSld>
+  <p:clrMapOvr>
+    <a:masterClrMapping/>
+  </p:clrMapOvr>
+</p:sld>
+</file>
+
+<file path=ppt/slides/slide11.xml><?xml version="1.0" encoding="utf-8"?>
+<p:sld xmlns:a="http://schemas.openxmlformats.org/drawingml/2006/main" xmlns:r="http://schemas.openxmlformats.org/officeDocument/2006/relationships" xmlns:p="http://schemas.openxmlformats.org/presentationml/2006/main">
+  <p:cSld>
+    <p:spTree>
+      <p:nvGrpSpPr>
+        <p:cNvPr id="1" name=""/>
+        <p:cNvGrpSpPr/>
+        <p:nvPr/>
+      </p:nvGrpSpPr>
+      <p:grpSpPr>
+        <a:xfrm>
+          <a:off x="0" y="0"/>
+          <a:ext cx="0" cy="0"/>
+          <a:chOff x="0" y="0"/>
+          <a:chExt cx="0" cy="0"/>
+        </a:xfrm>
+      </p:grpSpPr>
       <p:sp>
         <p:nvSpPr>
           <p:cNvPr id="2" name="Title 1">
@@ -3833,12 +4090,14 @@
         </p:nvSpPr>
         <p:spPr/>
         <p:txBody>
-          <a:bodyPr/>
-          <a:lstStyle/>
-          <a:p>
-            <a:r>
-              <a:rPr lang="el-GR" dirty="0"/>
-              <a:t>Πρόβλημα</a:t>
+          <a:bodyPr>
+            <a:normAutofit/>
+          </a:bodyPr>
+          <a:lstStyle/>
+          <a:p>
+            <a:r>
+              <a:rPr lang="el-GR" dirty="0"/>
+              <a:t>Πρόβλημα:</a:t>
             </a:r>
             <a:endParaRPr lang="en-US" dirty="0"/>
           </a:p>
@@ -4826,44 +5085,281 @@
           <a:p>
             <a:r>
               <a:rPr lang="el-GR" dirty="0"/>
-              <a:t>Παράδειγμα</a:t>
+              <a:t>Παράδειγμα (1/2)</a:t>
             </a:r>
             <a:endParaRPr lang="en-US" dirty="0"/>
           </a:p>
         </p:txBody>
       </p:sp>
-      <p:sp>
-        <p:nvSpPr>
-          <p:cNvPr id="3" name="Content Placeholder 2">
+      <p:grpSp>
+        <p:nvGrpSpPr>
+          <p:cNvPr id="6" name="Group 5">
             <a:extLst>
               <a:ext uri="{FF2B5EF4-FFF2-40B4-BE49-F238E27FC236}">
-                <a16:creationId xmlns:a16="http://schemas.microsoft.com/office/drawing/2014/main" id="{334B8A33-52C3-435A-99C5-FC736545F3AF}"/>
+                <a16:creationId xmlns:a16="http://schemas.microsoft.com/office/drawing/2014/main" id="{917F9526-41C3-4E87-A514-D40538A2C7DE}"/>
               </a:ext>
             </a:extLst>
           </p:cNvPr>
-          <p:cNvSpPr>
-            <a:spLocks noGrp="1"/>
-          </p:cNvSpPr>
-          <p:nvPr>
-            <p:ph idx="1"/>
-          </p:nvPr>
-        </p:nvSpPr>
-        <p:spPr/>
-        <p:txBody>
-          <a:bodyPr/>
+          <p:cNvGrpSpPr/>
+          <p:nvPr/>
+        </p:nvGrpSpPr>
+        <p:grpSpPr>
+          <a:xfrm>
+            <a:off x="6381750" y="139337"/>
+            <a:ext cx="5589666" cy="6630566"/>
+            <a:chOff x="3766865" y="357283"/>
+            <a:chExt cx="4257675" cy="6495320"/>
+          </a:xfrm>
+        </p:grpSpPr>
+        <p:pic>
+          <p:nvPicPr>
+            <p:cNvPr id="4" name="Picture 3">
+              <a:extLst>
+                <a:ext uri="{FF2B5EF4-FFF2-40B4-BE49-F238E27FC236}">
+                  <a16:creationId xmlns:a16="http://schemas.microsoft.com/office/drawing/2014/main" id="{19B7C59C-397F-45B9-A52F-E3F1B2B076CE}"/>
+                </a:ext>
+              </a:extLst>
+            </p:cNvPr>
+            <p:cNvPicPr>
+              <a:picLocks noChangeAspect="1"/>
+            </p:cNvPicPr>
+            <p:nvPr/>
+          </p:nvPicPr>
+          <p:blipFill>
+            <a:blip r:embed="rId2"/>
+            <a:stretch>
+              <a:fillRect/>
+            </a:stretch>
+          </p:blipFill>
+          <p:spPr>
+            <a:xfrm>
+              <a:off x="3766865" y="357283"/>
+              <a:ext cx="4171950" cy="4724400"/>
+            </a:xfrm>
+            <a:prstGeom prst="rect">
+              <a:avLst/>
+            </a:prstGeom>
+          </p:spPr>
+        </p:pic>
+        <p:pic>
+          <p:nvPicPr>
+            <p:cNvPr id="5" name="Picture 4">
+              <a:extLst>
+                <a:ext uri="{FF2B5EF4-FFF2-40B4-BE49-F238E27FC236}">
+                  <a16:creationId xmlns:a16="http://schemas.microsoft.com/office/drawing/2014/main" id="{8E1711E5-8646-47FD-9A61-D88279A2763F}"/>
+                </a:ext>
+              </a:extLst>
+            </p:cNvPr>
+            <p:cNvPicPr>
+              <a:picLocks noChangeAspect="1"/>
+            </p:cNvPicPr>
+            <p:nvPr/>
+          </p:nvPicPr>
+          <p:blipFill>
+            <a:blip r:embed="rId3"/>
+            <a:stretch>
+              <a:fillRect/>
+            </a:stretch>
+          </p:blipFill>
+          <p:spPr>
+            <a:xfrm>
+              <a:off x="3766865" y="4995228"/>
+              <a:ext cx="4257675" cy="1857375"/>
+            </a:xfrm>
+            <a:prstGeom prst="rect">
+              <a:avLst/>
+            </a:prstGeom>
+          </p:spPr>
+        </p:pic>
+      </p:grpSp>
+      <p:sp>
+        <p:nvSpPr>
+          <p:cNvPr id="7" name="TextBox 6">
+            <a:extLst>
+              <a:ext uri="{FF2B5EF4-FFF2-40B4-BE49-F238E27FC236}">
+                <a16:creationId xmlns:a16="http://schemas.microsoft.com/office/drawing/2014/main" id="{8ADBADF7-C8EA-40B9-9DA0-09E1C7C9B542}"/>
+              </a:ext>
+            </a:extLst>
+          </p:cNvPr>
+          <p:cNvSpPr txBox="1"/>
+          <p:nvPr/>
+        </p:nvSpPr>
+        <p:spPr>
+          <a:xfrm>
+            <a:off x="220584" y="1691590"/>
+            <a:ext cx="6048622" cy="5078313"/>
+          </a:xfrm>
+          <a:prstGeom prst="rect">
+            <a:avLst/>
+          </a:prstGeom>
+          <a:noFill/>
+        </p:spPr>
+        <p:txBody>
+          <a:bodyPr wrap="square" rtlCol="0">
+            <a:spAutoFit/>
+          </a:bodyPr>
           <a:lstStyle/>
           <a:p>
             <a:r>
               <a:rPr lang="en-US" dirty="0"/>
-              <a:t>(PLACEHOLDER)</a:t>
-            </a:r>
+              <a:t>	</a:t>
+            </a:r>
+            <a:r>
+              <a:rPr lang="el-GR" dirty="0"/>
+              <a:t>Στο συγκεκριμένο παράδειγμα, βλέπουμε μια υλοποίηση του </a:t>
+            </a:r>
+            <a:r>
+              <a:rPr lang="en-US" dirty="0"/>
+              <a:t>Retry Pattern </a:t>
+            </a:r>
+            <a:r>
+              <a:rPr lang="el-GR" dirty="0"/>
+              <a:t>σε </a:t>
+            </a:r>
+            <a:r>
+              <a:rPr lang="en-US" dirty="0"/>
+              <a:t>C#</a:t>
+            </a:r>
+            <a:r>
+              <a:rPr lang="el-GR" dirty="0"/>
+              <a:t>, από την οποία έχουνε παραληφθεί οι λεπτομέρειες της </a:t>
+            </a:r>
+            <a:r>
+              <a:rPr lang="en-US" dirty="0"/>
+              <a:t>TransientOperationAsync().</a:t>
+            </a:r>
+          </a:p>
+          <a:p>
+            <a:r>
+              <a:rPr lang="en-US" dirty="0"/>
+              <a:t>	</a:t>
+            </a:r>
+            <a:r>
+              <a:rPr lang="el-GR" dirty="0"/>
+              <a:t>Η κλήση της </a:t>
+            </a:r>
+            <a:r>
+              <a:rPr lang="en-US" dirty="0"/>
+              <a:t>TransientOperationAsync() </a:t>
+            </a:r>
+            <a:r>
+              <a:rPr lang="el-GR" dirty="0"/>
+              <a:t>γίνεται μέσα σε ένα </a:t>
+            </a:r>
+            <a:r>
+              <a:rPr lang="en-US" dirty="0"/>
+              <a:t>try block </a:t>
+            </a:r>
+            <a:r>
+              <a:rPr lang="el-GR" dirty="0"/>
+              <a:t>το οποίο με την σειρά του βρίσκεται μέσα σε ένα </a:t>
+            </a:r>
+            <a:r>
+              <a:rPr lang="en-US" dirty="0"/>
+              <a:t>infinite loop. </a:t>
+            </a:r>
+            <a:r>
+              <a:rPr lang="el-GR" dirty="0"/>
+              <a:t>Έξοδος από αυτή την επανάληψη πραγματοποιείται εφόσον η </a:t>
+            </a:r>
+            <a:r>
+              <a:rPr lang="en-US" dirty="0"/>
+              <a:t>TransientOperationAsync() </a:t>
+            </a:r>
+            <a:r>
+              <a:rPr lang="el-GR" dirty="0"/>
+              <a:t>δεν παρουσιάσει </a:t>
+            </a:r>
+            <a:r>
+              <a:rPr lang="en-US" dirty="0"/>
+              <a:t>exception.</a:t>
+            </a:r>
+          </a:p>
+          <a:p>
+            <a:r>
+              <a:rPr lang="en-US" dirty="0"/>
+              <a:t>	</a:t>
+            </a:r>
+            <a:r>
+              <a:rPr lang="el-GR" dirty="0"/>
+              <a:t>Εάν η </a:t>
+            </a:r>
+            <a:r>
+              <a:rPr lang="en-US" dirty="0"/>
+              <a:t>TransientOperationAsync</a:t>
+            </a:r>
+            <a:r>
+              <a:rPr lang="el-GR" dirty="0"/>
+              <a:t>() παρουσιάσει </a:t>
+            </a:r>
+            <a:r>
+              <a:rPr lang="en-US" dirty="0"/>
+              <a:t>exception</a:t>
+            </a:r>
+            <a:r>
+              <a:rPr lang="el-GR" dirty="0"/>
+              <a:t> τότε μέσα στο </a:t>
+            </a:r>
+            <a:r>
+              <a:rPr lang="en-US" dirty="0"/>
+              <a:t>catch block </a:t>
+            </a:r>
+            <a:r>
+              <a:rPr lang="el-GR" dirty="0"/>
+              <a:t>ελέγχεται ο αριθμός επαναλήψεων που έχει γίνει ήδη και το αν το </a:t>
+            </a:r>
+            <a:r>
+              <a:rPr lang="en-US" dirty="0"/>
+              <a:t>exception </a:t>
+            </a:r>
+            <a:r>
+              <a:rPr lang="el-GR" dirty="0"/>
+              <a:t>αυτό είναι παροδικό.</a:t>
+            </a:r>
+          </a:p>
+          <a:p>
+            <a:r>
+              <a:rPr lang="el-GR" dirty="0"/>
+              <a:t>	Σε περίπτωση που ο αριθμός των επαναλήψεων είναι μεγαλύτερος από αυτόν που έχει οριστεί ή το </a:t>
+            </a:r>
+            <a:r>
+              <a:rPr lang="en-US" dirty="0"/>
+              <a:t>exception </a:t>
+            </a:r>
+            <a:r>
+              <a:rPr lang="el-GR" dirty="0"/>
+              <a:t>δεν είναι παροδικό η </a:t>
+            </a:r>
+            <a:r>
+              <a:rPr lang="en-US" dirty="0"/>
+              <a:t>OperationWithBasicRetryAsync() </a:t>
+            </a:r>
+            <a:r>
+              <a:rPr lang="el-GR" dirty="0"/>
+              <a:t>παράγει </a:t>
+            </a:r>
+            <a:r>
+              <a:rPr lang="en-US" dirty="0"/>
+              <a:t>exception </a:t>
+            </a:r>
+            <a:r>
+              <a:rPr lang="el-GR" dirty="0"/>
+              <a:t>το οποίο πρέπει να χειριστεί ο κώδικας που την καλεί.</a:t>
+            </a:r>
+          </a:p>
+          <a:p>
+            <a:r>
+              <a:rPr lang="el-GR" dirty="0"/>
+              <a:t>	Διαφορετικά, υπάρχει μια ορισμένη από τον προγραμματιστή αναμονή πριν να γίνει καινούρια επανάληψη.</a:t>
+            </a:r>
+            <a:endParaRPr lang="en-US" dirty="0"/>
           </a:p>
         </p:txBody>
       </p:sp>
     </p:spTree>
     <p:extLst>
       <p:ext uri="{BB962C8B-B14F-4D97-AF65-F5344CB8AC3E}">
-        <p14:creationId xmlns:p14="http://schemas.microsoft.com/office/powerpoint/2010/main" val="273046310"/>
+        <p14:creationId xmlns:p14="http://schemas.microsoft.com/office/powerpoint/2010/main" val="4203759709"/>
       </p:ext>
     </p:extLst>
   </p:cSld>

</xml_diff>